<commit_message>
add new vesion powerpoint
</commit_message>
<xml_diff>
--- a/proposal/Proposal_v4.pptx
+++ b/proposal/Proposal_v4.pptx
@@ -852,7 +852,7 @@
           <a:p>
             <a:fld id="{FDEE6F2B-8AF1-43EC-B370-FCA2CA48B921}" type="datetimeFigureOut">
               <a:rPr lang="en-US" smtClean="0"/>
-              <a:t>1/31/2025</a:t>
+              <a:t>2/1/2025</a:t>
             </a:fld>
             <a:endParaRPr lang="en-US"/>
           </a:p>
@@ -1103,7 +1103,7 @@
           <a:p>
             <a:fld id="{FDEE6F2B-8AF1-43EC-B370-FCA2CA48B921}" type="datetimeFigureOut">
               <a:rPr lang="en-US" smtClean="0"/>
-              <a:t>1/31/2025</a:t>
+              <a:t>2/1/2025</a:t>
             </a:fld>
             <a:endParaRPr lang="en-US"/>
           </a:p>
@@ -1417,7 +1417,7 @@
           <a:p>
             <a:fld id="{FDEE6F2B-8AF1-43EC-B370-FCA2CA48B921}" type="datetimeFigureOut">
               <a:rPr lang="en-US" smtClean="0"/>
-              <a:t>1/31/2025</a:t>
+              <a:t>2/1/2025</a:t>
             </a:fld>
             <a:endParaRPr lang="en-US"/>
           </a:p>
@@ -1758,7 +1758,7 @@
           <a:p>
             <a:fld id="{FDEE6F2B-8AF1-43EC-B370-FCA2CA48B921}" type="datetimeFigureOut">
               <a:rPr lang="en-US" smtClean="0"/>
-              <a:t>1/31/2025</a:t>
+              <a:t>2/1/2025</a:t>
             </a:fld>
             <a:endParaRPr lang="en-US"/>
           </a:p>
@@ -2072,7 +2072,7 @@
           <a:p>
             <a:fld id="{FDEE6F2B-8AF1-43EC-B370-FCA2CA48B921}" type="datetimeFigureOut">
               <a:rPr lang="en-US" smtClean="0"/>
-              <a:t>1/31/2025</a:t>
+              <a:t>2/1/2025</a:t>
             </a:fld>
             <a:endParaRPr lang="en-US"/>
           </a:p>
@@ -2465,7 +2465,7 @@
           <a:p>
             <a:fld id="{FDEE6F2B-8AF1-43EC-B370-FCA2CA48B921}" type="datetimeFigureOut">
               <a:rPr lang="en-US" smtClean="0"/>
-              <a:t>1/31/2025</a:t>
+              <a:t>2/1/2025</a:t>
             </a:fld>
             <a:endParaRPr lang="en-US"/>
           </a:p>
@@ -2635,7 +2635,7 @@
           <a:p>
             <a:fld id="{FDEE6F2B-8AF1-43EC-B370-FCA2CA48B921}" type="datetimeFigureOut">
               <a:rPr lang="en-US" smtClean="0"/>
-              <a:t>1/31/2025</a:t>
+              <a:t>2/1/2025</a:t>
             </a:fld>
             <a:endParaRPr lang="en-US"/>
           </a:p>
@@ -2815,7 +2815,7 @@
           <a:p>
             <a:fld id="{FDEE6F2B-8AF1-43EC-B370-FCA2CA48B921}" type="datetimeFigureOut">
               <a:rPr lang="en-US" smtClean="0"/>
-              <a:t>1/31/2025</a:t>
+              <a:t>2/1/2025</a:t>
             </a:fld>
             <a:endParaRPr lang="en-US"/>
           </a:p>
@@ -2991,7 +2991,7 @@
           <a:p>
             <a:fld id="{FDEE6F2B-8AF1-43EC-B370-FCA2CA48B921}" type="datetimeFigureOut">
               <a:rPr lang="en-US" smtClean="0"/>
-              <a:t>1/31/2025</a:t>
+              <a:t>2/1/2025</a:t>
             </a:fld>
             <a:endParaRPr lang="en-US"/>
           </a:p>
@@ -3238,7 +3238,7 @@
           <a:p>
             <a:fld id="{FDEE6F2B-8AF1-43EC-B370-FCA2CA48B921}" type="datetimeFigureOut">
               <a:rPr lang="en-US" smtClean="0"/>
-              <a:t>1/31/2025</a:t>
+              <a:t>2/1/2025</a:t>
             </a:fld>
             <a:endParaRPr lang="en-US"/>
           </a:p>
@@ -3470,7 +3470,7 @@
           <a:p>
             <a:fld id="{FDEE6F2B-8AF1-43EC-B370-FCA2CA48B921}" type="datetimeFigureOut">
               <a:rPr lang="en-US" smtClean="0"/>
-              <a:t>1/31/2025</a:t>
+              <a:t>2/1/2025</a:t>
             </a:fld>
             <a:endParaRPr lang="en-US"/>
           </a:p>
@@ -3844,7 +3844,7 @@
           <a:p>
             <a:fld id="{FDEE6F2B-8AF1-43EC-B370-FCA2CA48B921}" type="datetimeFigureOut">
               <a:rPr lang="en-US" smtClean="0"/>
-              <a:t>1/31/2025</a:t>
+              <a:t>2/1/2025</a:t>
             </a:fld>
             <a:endParaRPr lang="en-US"/>
           </a:p>
@@ -3967,7 +3967,7 @@
           <a:p>
             <a:fld id="{FDEE6F2B-8AF1-43EC-B370-FCA2CA48B921}" type="datetimeFigureOut">
               <a:rPr lang="en-US" smtClean="0"/>
-              <a:t>1/31/2025</a:t>
+              <a:t>2/1/2025</a:t>
             </a:fld>
             <a:endParaRPr lang="en-US"/>
           </a:p>
@@ -4062,7 +4062,7 @@
           <a:p>
             <a:fld id="{FDEE6F2B-8AF1-43EC-B370-FCA2CA48B921}" type="datetimeFigureOut">
               <a:rPr lang="en-US" smtClean="0"/>
-              <a:t>1/31/2025</a:t>
+              <a:t>2/1/2025</a:t>
             </a:fld>
             <a:endParaRPr lang="en-US"/>
           </a:p>
@@ -4317,7 +4317,7 @@
           <a:p>
             <a:fld id="{FDEE6F2B-8AF1-43EC-B370-FCA2CA48B921}" type="datetimeFigureOut">
               <a:rPr lang="en-US" smtClean="0"/>
-              <a:t>1/31/2025</a:t>
+              <a:t>2/1/2025</a:t>
             </a:fld>
             <a:endParaRPr lang="en-US"/>
           </a:p>
@@ -4580,7 +4580,7 @@
           <a:p>
             <a:fld id="{FDEE6F2B-8AF1-43EC-B370-FCA2CA48B921}" type="datetimeFigureOut">
               <a:rPr lang="en-US" smtClean="0"/>
-              <a:t>1/31/2025</a:t>
+              <a:t>2/1/2025</a:t>
             </a:fld>
             <a:endParaRPr lang="en-US"/>
           </a:p>
@@ -5323,7 +5323,7 @@
           <a:p>
             <a:fld id="{FDEE6F2B-8AF1-43EC-B370-FCA2CA48B921}" type="datetimeFigureOut">
               <a:rPr lang="en-US" smtClean="0"/>
-              <a:t>1/31/2025</a:t>
+              <a:t>2/1/2025</a:t>
             </a:fld>
             <a:endParaRPr lang="en-US"/>
           </a:p>
@@ -6123,6 +6123,14 @@
   <p:clrMapOvr>
     <a:masterClrMapping/>
   </p:clrMapOvr>
+  <mc:AlternateContent xmlns:mc="http://schemas.openxmlformats.org/markup-compatibility/2006">
+    <mc:Choice xmlns:p14="http://schemas.microsoft.com/office/powerpoint/2010/main" Requires="p14">
+      <p:transition spd="slow" p14:dur="2000" advTm="483"/>
+    </mc:Choice>
+    <mc:Fallback>
+      <p:transition spd="slow" advTm="483"/>
+    </mc:Fallback>
+  </mc:AlternateContent>
 </p:sld>
 </file>
 
@@ -8086,7 +8094,7 @@
           <p:nvPr>
             <p:extLst>
               <p:ext uri="{D42A27DB-BD31-4B8C-83A1-F6EECF244321}">
-                <p14:modId xmlns:p14="http://schemas.microsoft.com/office/powerpoint/2010/main" val="863003448"/>
+                <p14:modId xmlns:p14="http://schemas.microsoft.com/office/powerpoint/2010/main" val="2734237033"/>
               </p:ext>
             </p:extLst>
           </p:nvPr>
@@ -8326,14 +8334,14 @@
                     <a:p>
                       <a:pPr algn="l" fontAlgn="ctr"/>
                       <a:r>
-                        <a:rPr lang="en-US" sz="2600" u="none" strike="noStrike">
+                        <a:rPr lang="en-US" sz="2600" u="none" strike="noStrike" dirty="0">
                           <a:effectLst/>
                           <a:latin typeface="TH Sarabun New" panose="020B0500040200020003" pitchFamily="34" charset="-34"/>
                           <a:cs typeface="TH Sarabun New" panose="020B0500040200020003" pitchFamily="34" charset="-34"/>
                         </a:rPr>
                         <a:t>Shards</a:t>
                       </a:r>
-                      <a:endParaRPr lang="en-US" sz="2600" b="1" i="0" u="none" strike="noStrike">
+                      <a:endParaRPr lang="en-US" sz="2600" b="1" i="0" u="none" strike="noStrike" dirty="0">
                         <a:solidFill>
                           <a:srgbClr val="000000"/>
                         </a:solidFill>
@@ -8385,14 +8393,14 @@
                     <a:p>
                       <a:pPr algn="l" fontAlgn="ctr"/>
                       <a:r>
-                        <a:rPr lang="en-US" sz="2600" u="none" strike="noStrike">
+                        <a:rPr lang="en-US" sz="2600" u="none" strike="noStrike" dirty="0">
                           <a:effectLst/>
                           <a:latin typeface="TH Sarabun New" panose="020B0500040200020003" pitchFamily="34" charset="-34"/>
                           <a:cs typeface="TH Sarabun New" panose="020B0500040200020003" pitchFamily="34" charset="-34"/>
                         </a:rPr>
                         <a:t>Mappings</a:t>
                       </a:r>
-                      <a:endParaRPr lang="en-US" sz="2600" b="1" i="0" u="none" strike="noStrike">
+                      <a:endParaRPr lang="en-US" sz="2600" b="1" i="0" u="none" strike="noStrike" dirty="0">
                         <a:solidFill>
                           <a:srgbClr val="000000"/>
                         </a:solidFill>
@@ -8444,14 +8452,14 @@
                     <a:p>
                       <a:pPr algn="l" fontAlgn="ctr"/>
                       <a:r>
-                        <a:rPr lang="en-US" sz="2600" u="none" strike="noStrike">
+                        <a:rPr lang="en-US" sz="2600" u="none" strike="noStrike" dirty="0">
                           <a:effectLst/>
                           <a:latin typeface="TH Sarabun New" panose="020B0500040200020003" pitchFamily="34" charset="-34"/>
                           <a:cs typeface="TH Sarabun New" panose="020B0500040200020003" pitchFamily="34" charset="-34"/>
                         </a:rPr>
                         <a:t>Analyzers</a:t>
                       </a:r>
-                      <a:endParaRPr lang="en-US" sz="2600" b="1" i="0" u="none" strike="noStrike">
+                      <a:endParaRPr lang="en-US" sz="2600" b="1" i="0" u="none" strike="noStrike" dirty="0">
                         <a:solidFill>
                           <a:srgbClr val="000000"/>
                         </a:solidFill>
@@ -8475,7 +8483,7 @@
                           <a:latin typeface="TH Sarabun New" panose="020B0500040200020003" pitchFamily="34" charset="-34"/>
                           <a:cs typeface="TH Sarabun New" panose="020B0500040200020003" pitchFamily="34" charset="-34"/>
                         </a:rPr>
-                        <a:t>ช่วยตัดคำและจัดรูปแบบข้อมูลก่อนทำดัชนี</a:t>
+                        <a:t>ช่วยตัดคำและจัดรูปแบบข้อมูล</a:t>
                       </a:r>
                       <a:endParaRPr lang="th-TH" sz="2600" b="0" i="0" u="none" strike="noStrike" dirty="0">
                         <a:solidFill>
@@ -11221,7 +11229,62 @@
                 <a:ea typeface="Angsana New" panose="02020603050405020304" pitchFamily="18" charset="-34"/>
                 <a:cs typeface="TH Sarabun New" panose="020B0500040200020003" pitchFamily="34" charset="-34"/>
               </a:rPr>
-              <a:t>CH4) </a:t>
+              <a:t>CH4)</a:t>
+            </a:r>
+            <a:r>
+              <a:rPr lang="th-TH" sz="2600" dirty="0">
+                <a:solidFill>
+                  <a:srgbClr val="000000"/>
+                </a:solidFill>
+                <a:uFill>
+                  <a:solidFill>
+                    <a:srgbClr val="000000"/>
+                  </a:solidFill>
+                </a:uFill>
+                <a:latin typeface="TH Sarabun New" panose="020B0500040200020003" pitchFamily="34" charset="-34"/>
+                <a:ea typeface="Angsana New" panose="02020603050405020304" pitchFamily="18" charset="-34"/>
+                <a:cs typeface="TH Sarabun New" panose="020B0500040200020003" pitchFamily="34" charset="-34"/>
+              </a:rPr>
+              <a:t> </a:t>
+            </a:r>
+            <a:r>
+              <a:rPr lang="th-TH" sz="2600" b="0" i="0" dirty="0">
+                <a:solidFill>
+                  <a:srgbClr val="000000"/>
+                </a:solidFill>
+                <a:effectLst/>
+                <a:latin typeface="TH Sarabun New" panose="020B0500040200020003" pitchFamily="34" charset="-34"/>
+                <a:cs typeface="TH Sarabun New" panose="020B0500040200020003" pitchFamily="34" charset="-34"/>
+              </a:rPr>
+              <a:t> ก๊าซไนตรัสออกไซด์ (</a:t>
+            </a:r>
+            <a:r>
+              <a:rPr lang="en-US" sz="2600" b="0" i="0" dirty="0">
+                <a:solidFill>
+                  <a:srgbClr val="000000"/>
+                </a:solidFill>
+                <a:effectLst/>
+                <a:latin typeface="TH Sarabun New" panose="020B0500040200020003" pitchFamily="34" charset="-34"/>
+                <a:cs typeface="TH Sarabun New" panose="020B0500040200020003" pitchFamily="34" charset="-34"/>
+              </a:rPr>
+              <a:t>N2O) </a:t>
+            </a:r>
+            <a:r>
+              <a:rPr lang="en-US" sz="2600" b="0" dirty="0">
+                <a:solidFill>
+                  <a:srgbClr val="000000"/>
+                </a:solidFill>
+                <a:effectLst/>
+                <a:uFill>
+                  <a:solidFill>
+                    <a:srgbClr val="000000"/>
+                  </a:solidFill>
+                </a:uFill>
+                <a:latin typeface="TH Sarabun New" panose="020B0500040200020003" pitchFamily="34" charset="-34"/>
+                <a:ea typeface="Angsana New" panose="02020603050405020304" pitchFamily="18" charset="-34"/>
+                <a:cs typeface="TH Sarabun New" panose="020B0500040200020003" pitchFamily="34" charset="-34"/>
+              </a:rPr>
+              <a:t> </a:t>
             </a:r>
             <a:r>
               <a:rPr lang="th-TH" sz="2600" b="0" dirty="0">
@@ -15389,18 +15452,18 @@
 </file>
 
 <file path=customXml/item1.xml><?xml version="1.0" encoding="utf-8"?>
+<p:properties xmlns:p="http://schemas.microsoft.com/office/2006/metadata/properties" xmlns:xsi="http://www.w3.org/2001/XMLSchema-instance" xmlns:pc="http://schemas.microsoft.com/office/infopath/2007/PartnerControls">
+  <documentManagement/>
+</p:properties>
+</file>
+
+<file path=customXml/item2.xml><?xml version="1.0" encoding="utf-8"?>
 <?mso-contentType ?>
 <FormTemplates xmlns="http://schemas.microsoft.com/sharepoint/v3/contenttype/forms">
   <Display>DocumentLibraryForm</Display>
   <Edit>DocumentLibraryForm</Edit>
   <New>DocumentLibraryForm</New>
 </FormTemplates>
-</file>
-
-<file path=customXml/item2.xml><?xml version="1.0" encoding="utf-8"?>
-<p:properties xmlns:p="http://schemas.microsoft.com/office/2006/metadata/properties" xmlns:xsi="http://www.w3.org/2001/XMLSchema-instance" xmlns:pc="http://schemas.microsoft.com/office/infopath/2007/PartnerControls">
-  <documentManagement/>
-</p:properties>
 </file>
 
 <file path=customXml/item3.xml><?xml version="1.0" encoding="utf-8"?>
@@ -15554,14 +15617,6 @@
 </file>
 
 <file path=customXml/itemProps1.xml><?xml version="1.0" encoding="utf-8"?>
-<ds:datastoreItem xmlns:ds="http://schemas.openxmlformats.org/officeDocument/2006/customXml" ds:itemID="{EEA3426A-D9CD-4D97-A56B-FC5574F7293D}">
-  <ds:schemaRefs>
-    <ds:schemaRef ds:uri="http://schemas.microsoft.com/sharepoint/v3/contenttype/forms"/>
-  </ds:schemaRefs>
-</ds:datastoreItem>
-</file>
-
-<file path=customXml/itemProps2.xml><?xml version="1.0" encoding="utf-8"?>
 <ds:datastoreItem xmlns:ds="http://schemas.openxmlformats.org/officeDocument/2006/customXml" ds:itemID="{B2C48F46-9B33-48DB-BECB-A211F1066C6C}">
   <ds:schemaRefs>
     <ds:schemaRef ds:uri="http://purl.org/dc/terms/"/>
@@ -15573,6 +15628,14 @@
     <ds:schemaRef ds:uri="05f8cd53-000c-42cc-b8f1-6cc2179124ab"/>
     <ds:schemaRef ds:uri="http://schemas.openxmlformats.org/package/2006/metadata/core-properties"/>
     <ds:schemaRef ds:uri="http://www.w3.org/XML/1998/namespace"/>
+  </ds:schemaRefs>
+</ds:datastoreItem>
+</file>
+
+<file path=customXml/itemProps2.xml><?xml version="1.0" encoding="utf-8"?>
+<ds:datastoreItem xmlns:ds="http://schemas.openxmlformats.org/officeDocument/2006/customXml" ds:itemID="{EEA3426A-D9CD-4D97-A56B-FC5574F7293D}">
+  <ds:schemaRefs>
+    <ds:schemaRef ds:uri="http://schemas.microsoft.com/sharepoint/v3/contenttype/forms"/>
   </ds:schemaRefs>
 </ds:datastoreItem>
 </file>

</xml_diff>